<commit_message>
Tree Decision: Presentation UCE
</commit_message>
<xml_diff>
--- a/Dcm/Actualizacion_2023_DiegoCuasapaz_Deber4.pptx
+++ b/Dcm/Actualizacion_2023_DiegoCuasapaz_Deber4.pptx
@@ -7996,7 +7996,7 @@
           <a:p>
             <a:fld id="{FE071CE8-60CC-4EA3-B5E1-B77DC2AC439E}" type="datetimeFigureOut">
               <a:rPr lang="en-US" smtClean="0"/>
-              <a:t>2023-08-13</a:t>
+              <a:t>2023-08-14</a:t>
             </a:fld>
             <a:endParaRPr lang="en-US"/>
           </a:p>
@@ -8194,7 +8194,7 @@
           <a:p>
             <a:fld id="{FE071CE8-60CC-4EA3-B5E1-B77DC2AC439E}" type="datetimeFigureOut">
               <a:rPr lang="en-US" smtClean="0"/>
-              <a:t>2023-08-13</a:t>
+              <a:t>2023-08-14</a:t>
             </a:fld>
             <a:endParaRPr lang="en-US"/>
           </a:p>
@@ -8402,7 +8402,7 @@
           <a:p>
             <a:fld id="{FE071CE8-60CC-4EA3-B5E1-B77DC2AC439E}" type="datetimeFigureOut">
               <a:rPr lang="en-US" smtClean="0"/>
-              <a:t>2023-08-13</a:t>
+              <a:t>2023-08-14</a:t>
             </a:fld>
             <a:endParaRPr lang="en-US"/>
           </a:p>
@@ -8600,7 +8600,7 @@
           <a:p>
             <a:fld id="{FE071CE8-60CC-4EA3-B5E1-B77DC2AC439E}" type="datetimeFigureOut">
               <a:rPr lang="en-US" smtClean="0"/>
-              <a:t>2023-08-13</a:t>
+              <a:t>2023-08-14</a:t>
             </a:fld>
             <a:endParaRPr lang="en-US"/>
           </a:p>
@@ -8875,7 +8875,7 @@
           <a:p>
             <a:fld id="{FE071CE8-60CC-4EA3-B5E1-B77DC2AC439E}" type="datetimeFigureOut">
               <a:rPr lang="en-US" smtClean="0"/>
-              <a:t>2023-08-13</a:t>
+              <a:t>2023-08-14</a:t>
             </a:fld>
             <a:endParaRPr lang="en-US"/>
           </a:p>
@@ -9140,7 +9140,7 @@
           <a:p>
             <a:fld id="{FE071CE8-60CC-4EA3-B5E1-B77DC2AC439E}" type="datetimeFigureOut">
               <a:rPr lang="en-US" smtClean="0"/>
-              <a:t>2023-08-13</a:t>
+              <a:t>2023-08-14</a:t>
             </a:fld>
             <a:endParaRPr lang="en-US"/>
           </a:p>
@@ -9552,7 +9552,7 @@
           <a:p>
             <a:fld id="{FE071CE8-60CC-4EA3-B5E1-B77DC2AC439E}" type="datetimeFigureOut">
               <a:rPr lang="en-US" smtClean="0"/>
-              <a:t>2023-08-13</a:t>
+              <a:t>2023-08-14</a:t>
             </a:fld>
             <a:endParaRPr lang="en-US"/>
           </a:p>
@@ -9693,7 +9693,7 @@
           <a:p>
             <a:fld id="{FE071CE8-60CC-4EA3-B5E1-B77DC2AC439E}" type="datetimeFigureOut">
               <a:rPr lang="en-US" smtClean="0"/>
-              <a:t>2023-08-13</a:t>
+              <a:t>2023-08-14</a:t>
             </a:fld>
             <a:endParaRPr lang="en-US"/>
           </a:p>
@@ -9806,7 +9806,7 @@
           <a:p>
             <a:fld id="{FE071CE8-60CC-4EA3-B5E1-B77DC2AC439E}" type="datetimeFigureOut">
               <a:rPr lang="en-US" smtClean="0"/>
-              <a:t>2023-08-13</a:t>
+              <a:t>2023-08-14</a:t>
             </a:fld>
             <a:endParaRPr lang="en-US"/>
           </a:p>
@@ -10117,7 +10117,7 @@
           <a:p>
             <a:fld id="{FE071CE8-60CC-4EA3-B5E1-B77DC2AC439E}" type="datetimeFigureOut">
               <a:rPr lang="en-US" smtClean="0"/>
-              <a:t>2023-08-13</a:t>
+              <a:t>2023-08-14</a:t>
             </a:fld>
             <a:endParaRPr lang="en-US"/>
           </a:p>
@@ -10405,7 +10405,7 @@
           <a:p>
             <a:fld id="{FE071CE8-60CC-4EA3-B5E1-B77DC2AC439E}" type="datetimeFigureOut">
               <a:rPr lang="en-US" smtClean="0"/>
-              <a:t>2023-08-13</a:t>
+              <a:t>2023-08-14</a:t>
             </a:fld>
             <a:endParaRPr lang="en-US"/>
           </a:p>
@@ -10646,7 +10646,7 @@
           <a:p>
             <a:fld id="{FE071CE8-60CC-4EA3-B5E1-B77DC2AC439E}" type="datetimeFigureOut">
               <a:rPr lang="en-US" smtClean="0"/>
-              <a:t>2023-08-13</a:t>
+              <a:t>2023-08-14</a:t>
             </a:fld>
             <a:endParaRPr lang="en-US"/>
           </a:p>
@@ -12295,8 +12295,8 @@
         </p:blipFill>
         <p:spPr bwMode="auto">
           <a:xfrm>
-            <a:off x="0" y="3745762"/>
-            <a:ext cx="2967149" cy="2967149"/>
+            <a:off x="152400" y="4341330"/>
+            <a:ext cx="2026667" cy="2026667"/>
           </a:xfrm>
           <a:prstGeom prst="rect">
             <a:avLst/>
@@ -12327,8 +12327,8 @@
         </p:nvSpPr>
         <p:spPr>
           <a:xfrm>
-            <a:off x="2026667" y="2235871"/>
-            <a:ext cx="4356340" cy="1553852"/>
+            <a:off x="970902" y="2329111"/>
+            <a:ext cx="2792950" cy="1553852"/>
           </a:xfrm>
           <a:prstGeom prst="cloudCallout">
             <a:avLst>
@@ -12363,9 +12363,1926 @@
           <a:p>
             <a:pPr algn="ctr"/>
             <a:r>
-              <a:rPr lang="es-419" dirty="0"/>
+              <a:rPr lang="es-419" sz="1200" dirty="0">
+                <a:latin typeface="Arial Nova Cond Light" panose="020B0306020202020204" pitchFamily="34" charset="0"/>
+              </a:rPr>
               <a:t>Un lugar seguro para ir un fin de semana ?</a:t>
             </a:r>
+          </a:p>
+        </p:txBody>
+      </p:sp>
+      <p:graphicFrame>
+        <p:nvGraphicFramePr>
+          <p:cNvPr id="3" name="Table 8">
+            <a:extLst>
+              <a:ext uri="{FF2B5EF4-FFF2-40B4-BE49-F238E27FC236}">
+                <a16:creationId xmlns:a16="http://schemas.microsoft.com/office/drawing/2014/main" id="{39854645-7409-2783-EA6D-E99D123EB21B}"/>
+              </a:ext>
+            </a:extLst>
+          </p:cNvPr>
+          <p:cNvGraphicFramePr>
+            <a:graphicFrameLocks noGrp="1"/>
+          </p:cNvGraphicFramePr>
+          <p:nvPr>
+            <p:extLst>
+              <p:ext uri="{D42A27DB-BD31-4B8C-83A1-F6EECF244321}">
+                <p14:modId xmlns:p14="http://schemas.microsoft.com/office/powerpoint/2010/main" val="2905689217"/>
+              </p:ext>
+            </p:extLst>
+          </p:nvPr>
+        </p:nvGraphicFramePr>
+        <p:xfrm>
+          <a:off x="7795603" y="2593376"/>
+          <a:ext cx="2451581" cy="1219200"/>
+        </p:xfrm>
+        <a:graphic>
+          <a:graphicData uri="http://schemas.openxmlformats.org/drawingml/2006/table">
+            <a:tbl>
+              <a:tblPr firstRow="1" bandRow="1">
+                <a:tableStyleId>{3B4B98B0-60AC-42C2-AFA5-B58CD77FA1E5}</a:tableStyleId>
+              </a:tblPr>
+              <a:tblGrid>
+                <a:gridCol w="527368">
+                  <a:extLst>
+                    <a:ext uri="{9D8B030D-6E8A-4147-A177-3AD203B41FA5}">
+                      <a16:colId xmlns:a16="http://schemas.microsoft.com/office/drawing/2014/main" val="2663020655"/>
+                    </a:ext>
+                  </a:extLst>
+                </a:gridCol>
+                <a:gridCol w="694055">
+                  <a:extLst>
+                    <a:ext uri="{9D8B030D-6E8A-4147-A177-3AD203B41FA5}">
+                      <a16:colId xmlns:a16="http://schemas.microsoft.com/office/drawing/2014/main" val="1051804691"/>
+                    </a:ext>
+                  </a:extLst>
+                </a:gridCol>
+                <a:gridCol w="1230158">
+                  <a:extLst>
+                    <a:ext uri="{9D8B030D-6E8A-4147-A177-3AD203B41FA5}">
+                      <a16:colId xmlns:a16="http://schemas.microsoft.com/office/drawing/2014/main" val="273057811"/>
+                    </a:ext>
+                  </a:extLst>
+                </a:gridCol>
+              </a:tblGrid>
+              <a:tr h="219456">
+                <a:tc>
+                  <a:txBody>
+                    <a:bodyPr/>
+                    <a:lstStyle/>
+                    <a:p>
+                      <a:pPr algn="ctr"/>
+                      <a:r>
+                        <a:rPr lang="en-US" sz="1000" dirty="0">
+                          <a:latin typeface="Arial Nova Cond Light" panose="020B0306020202020204" pitchFamily="34" charset="0"/>
+                        </a:rPr>
+                        <a:t>Valor</a:t>
+                      </a:r>
+                      <a:endParaRPr lang="es-419" sz="1000" dirty="0">
+                        <a:latin typeface="Arial Nova Cond Light" panose="020B0306020202020204" pitchFamily="34" charset="0"/>
+                      </a:endParaRPr>
+                    </a:p>
+                  </a:txBody>
+                  <a:tcPr anchor="ctr"/>
+                </a:tc>
+                <a:tc>
+                  <a:txBody>
+                    <a:bodyPr/>
+                    <a:lstStyle/>
+                    <a:p>
+                      <a:pPr algn="ctr"/>
+                      <a:r>
+                        <a:rPr lang="en-US" sz="1000" dirty="0">
+                          <a:latin typeface="Arial Nova Cond Light" panose="020B0306020202020204" pitchFamily="34" charset="0"/>
+                        </a:rPr>
+                        <a:t>Color</a:t>
+                      </a:r>
+                      <a:endParaRPr lang="es-419" sz="1000" dirty="0">
+                        <a:latin typeface="Arial Nova Cond Light" panose="020B0306020202020204" pitchFamily="34" charset="0"/>
+                      </a:endParaRPr>
+                    </a:p>
+                  </a:txBody>
+                  <a:tcPr anchor="ctr"/>
+                </a:tc>
+                <a:tc>
+                  <a:txBody>
+                    <a:bodyPr/>
+                    <a:lstStyle/>
+                    <a:p>
+                      <a:pPr algn="ctr"/>
+                      <a:r>
+                        <a:rPr lang="en-US" sz="1000" dirty="0" err="1">
+                          <a:latin typeface="Arial Nova Cond Light" panose="020B0306020202020204" pitchFamily="34" charset="0"/>
+                        </a:rPr>
+                        <a:t>Texto</a:t>
+                      </a:r>
+                      <a:endParaRPr lang="es-419" sz="1000" dirty="0">
+                        <a:latin typeface="Arial Nova Cond Light" panose="020B0306020202020204" pitchFamily="34" charset="0"/>
+                      </a:endParaRPr>
+                    </a:p>
+                  </a:txBody>
+                  <a:tcPr anchor="ctr"/>
+                </a:tc>
+                <a:extLst>
+                  <a:ext uri="{0D108BD9-81ED-4DB2-BD59-A6C34878D82A}">
+                    <a16:rowId xmlns:a16="http://schemas.microsoft.com/office/drawing/2014/main" val="1426178727"/>
+                  </a:ext>
+                </a:extLst>
+              </a:tr>
+              <a:tr h="219456">
+                <a:tc>
+                  <a:txBody>
+                    <a:bodyPr/>
+                    <a:lstStyle/>
+                    <a:p>
+                      <a:r>
+                        <a:rPr lang="en-US" sz="1000" dirty="0">
+                          <a:latin typeface="Arial Nova Cond Light" panose="020B0306020202020204" pitchFamily="34" charset="0"/>
+                        </a:rPr>
+                        <a:t>0</a:t>
+                      </a:r>
+                      <a:endParaRPr lang="es-419" sz="1000" dirty="0">
+                        <a:latin typeface="Arial Nova Cond Light" panose="020B0306020202020204" pitchFamily="34" charset="0"/>
+                      </a:endParaRPr>
+                    </a:p>
+                  </a:txBody>
+                  <a:tcPr/>
+                </a:tc>
+                <a:tc>
+                  <a:txBody>
+                    <a:bodyPr/>
+                    <a:lstStyle/>
+                    <a:p>
+                      <a:r>
+                        <a:rPr lang="en-US" sz="1000" dirty="0">
+                          <a:latin typeface="Arial Nova Cond Light" panose="020B0306020202020204" pitchFamily="34" charset="0"/>
+                        </a:rPr>
+                        <a:t>Gris</a:t>
+                      </a:r>
+                      <a:endParaRPr lang="es-419" sz="1000" dirty="0">
+                        <a:latin typeface="Arial Nova Cond Light" panose="020B0306020202020204" pitchFamily="34" charset="0"/>
+                      </a:endParaRPr>
+                    </a:p>
+                  </a:txBody>
+                  <a:tcPr/>
+                </a:tc>
+                <a:tc>
+                  <a:txBody>
+                    <a:bodyPr/>
+                    <a:lstStyle/>
+                    <a:p>
+                      <a:pPr marL="0" marR="0" lvl="0" indent="0" algn="l" defTabSz="914400" rtl="0" eaLnBrk="1" fontAlgn="auto" latinLnBrk="0" hangingPunct="1">
+                        <a:lnSpc>
+                          <a:spcPct val="100000"/>
+                        </a:lnSpc>
+                        <a:spcBef>
+                          <a:spcPts val="0"/>
+                        </a:spcBef>
+                        <a:spcAft>
+                          <a:spcPts val="0"/>
+                        </a:spcAft>
+                        <a:buClrTx/>
+                        <a:buSzTx/>
+                        <a:buFontTx/>
+                        <a:buNone/>
+                        <a:tabLst/>
+                        <a:defRPr/>
+                      </a:pPr>
+                      <a:r>
+                        <a:rPr lang="es-419" sz="1000" b="0" kern="1200" dirty="0">
+                          <a:solidFill>
+                            <a:schemeClr val="dk1"/>
+                          </a:solidFill>
+                          <a:effectLst/>
+                          <a:latin typeface="Arial Nova Cond Light" panose="020B0306020202020204" pitchFamily="34" charset="0"/>
+                        </a:rPr>
+                        <a:t>NO CALIFICADO</a:t>
+                      </a:r>
+                      <a:endParaRPr lang="es-419" sz="1000" b="0" kern="1200" dirty="0">
+                        <a:solidFill>
+                          <a:schemeClr val="dk1"/>
+                        </a:solidFill>
+                        <a:effectLst/>
+                        <a:latin typeface="Arial Nova Cond Light" panose="020B0306020202020204" pitchFamily="34" charset="0"/>
+                        <a:ea typeface="+mn-ea"/>
+                        <a:cs typeface="+mn-cs"/>
+                      </a:endParaRPr>
+                    </a:p>
+                  </a:txBody>
+                  <a:tcPr/>
+                </a:tc>
+                <a:extLst>
+                  <a:ext uri="{0D108BD9-81ED-4DB2-BD59-A6C34878D82A}">
+                    <a16:rowId xmlns:a16="http://schemas.microsoft.com/office/drawing/2014/main" val="760433361"/>
+                  </a:ext>
+                </a:extLst>
+              </a:tr>
+              <a:tr h="219456">
+                <a:tc>
+                  <a:txBody>
+                    <a:bodyPr/>
+                    <a:lstStyle/>
+                    <a:p>
+                      <a:r>
+                        <a:rPr lang="en-US" sz="1000" dirty="0">
+                          <a:latin typeface="Arial Nova Cond Light" panose="020B0306020202020204" pitchFamily="34" charset="0"/>
+                        </a:rPr>
+                        <a:t>1</a:t>
+                      </a:r>
+                      <a:endParaRPr lang="es-419" sz="1000" dirty="0">
+                        <a:latin typeface="Arial Nova Cond Light" panose="020B0306020202020204" pitchFamily="34" charset="0"/>
+                      </a:endParaRPr>
+                    </a:p>
+                  </a:txBody>
+                  <a:tcPr/>
+                </a:tc>
+                <a:tc>
+                  <a:txBody>
+                    <a:bodyPr/>
+                    <a:lstStyle/>
+                    <a:p>
+                      <a:r>
+                        <a:rPr lang="en-US" sz="1000" dirty="0">
+                          <a:latin typeface="Arial Nova Cond Light" panose="020B0306020202020204" pitchFamily="34" charset="0"/>
+                        </a:rPr>
+                        <a:t>Rojo</a:t>
+                      </a:r>
+                      <a:endParaRPr lang="es-419" sz="1000" dirty="0">
+                        <a:latin typeface="Arial Nova Cond Light" panose="020B0306020202020204" pitchFamily="34" charset="0"/>
+                      </a:endParaRPr>
+                    </a:p>
+                  </a:txBody>
+                  <a:tcPr/>
+                </a:tc>
+                <a:tc>
+                  <a:txBody>
+                    <a:bodyPr/>
+                    <a:lstStyle/>
+                    <a:p>
+                      <a:pPr marL="0" marR="0" lvl="0" indent="0" algn="l" defTabSz="914400" rtl="0" eaLnBrk="1" fontAlgn="auto" latinLnBrk="0" hangingPunct="1">
+                        <a:lnSpc>
+                          <a:spcPct val="100000"/>
+                        </a:lnSpc>
+                        <a:spcBef>
+                          <a:spcPts val="0"/>
+                        </a:spcBef>
+                        <a:spcAft>
+                          <a:spcPts val="0"/>
+                        </a:spcAft>
+                        <a:buClrTx/>
+                        <a:buSzTx/>
+                        <a:buFontTx/>
+                        <a:buNone/>
+                        <a:tabLst/>
+                        <a:defRPr/>
+                      </a:pPr>
+                      <a:r>
+                        <a:rPr lang="es-419" sz="1000" b="0" kern="1200" dirty="0">
+                          <a:solidFill>
+                            <a:schemeClr val="dk1"/>
+                          </a:solidFill>
+                          <a:effectLst/>
+                          <a:latin typeface="Arial Nova Cond Light" panose="020B0306020202020204" pitchFamily="34" charset="0"/>
+                        </a:rPr>
+                        <a:t>INICIANDO</a:t>
+                      </a:r>
+                      <a:endParaRPr lang="es-419" sz="1000" b="0" kern="1200" dirty="0">
+                        <a:solidFill>
+                          <a:schemeClr val="dk1"/>
+                        </a:solidFill>
+                        <a:effectLst/>
+                        <a:latin typeface="Arial Nova Cond Light" panose="020B0306020202020204" pitchFamily="34" charset="0"/>
+                        <a:ea typeface="+mn-ea"/>
+                        <a:cs typeface="+mn-cs"/>
+                      </a:endParaRPr>
+                    </a:p>
+                  </a:txBody>
+                  <a:tcPr/>
+                </a:tc>
+                <a:extLst>
+                  <a:ext uri="{0D108BD9-81ED-4DB2-BD59-A6C34878D82A}">
+                    <a16:rowId xmlns:a16="http://schemas.microsoft.com/office/drawing/2014/main" val="3368253912"/>
+                  </a:ext>
+                </a:extLst>
+              </a:tr>
+              <a:tr h="219456">
+                <a:tc>
+                  <a:txBody>
+                    <a:bodyPr/>
+                    <a:lstStyle/>
+                    <a:p>
+                      <a:r>
+                        <a:rPr lang="en-US" sz="1000" dirty="0">
+                          <a:latin typeface="Arial Nova Cond Light" panose="020B0306020202020204" pitchFamily="34" charset="0"/>
+                        </a:rPr>
+                        <a:t>2</a:t>
+                      </a:r>
+                      <a:endParaRPr lang="es-419" sz="1000" dirty="0">
+                        <a:latin typeface="Arial Nova Cond Light" panose="020B0306020202020204" pitchFamily="34" charset="0"/>
+                      </a:endParaRPr>
+                    </a:p>
+                  </a:txBody>
+                  <a:tcPr/>
+                </a:tc>
+                <a:tc>
+                  <a:txBody>
+                    <a:bodyPr/>
+                    <a:lstStyle/>
+                    <a:p>
+                      <a:r>
+                        <a:rPr lang="en-US" sz="1000" dirty="0">
+                          <a:latin typeface="Arial Nova Cond Light" panose="020B0306020202020204" pitchFamily="34" charset="0"/>
+                        </a:rPr>
+                        <a:t>Amarillo</a:t>
+                      </a:r>
+                      <a:endParaRPr lang="es-419" sz="1000" dirty="0">
+                        <a:latin typeface="Arial Nova Cond Light" panose="020B0306020202020204" pitchFamily="34" charset="0"/>
+                      </a:endParaRPr>
+                    </a:p>
+                  </a:txBody>
+                  <a:tcPr/>
+                </a:tc>
+                <a:tc>
+                  <a:txBody>
+                    <a:bodyPr/>
+                    <a:lstStyle/>
+                    <a:p>
+                      <a:pPr marL="0" marR="0" lvl="0" indent="0" algn="l" defTabSz="914400" rtl="0" eaLnBrk="1" fontAlgn="auto" latinLnBrk="0" hangingPunct="1">
+                        <a:lnSpc>
+                          <a:spcPct val="100000"/>
+                        </a:lnSpc>
+                        <a:spcBef>
+                          <a:spcPts val="0"/>
+                        </a:spcBef>
+                        <a:spcAft>
+                          <a:spcPts val="0"/>
+                        </a:spcAft>
+                        <a:buClrTx/>
+                        <a:buSzTx/>
+                        <a:buFontTx/>
+                        <a:buNone/>
+                        <a:tabLst/>
+                        <a:defRPr/>
+                      </a:pPr>
+                      <a:r>
+                        <a:rPr lang="es-419" sz="1000" b="0" kern="1200" dirty="0">
+                          <a:solidFill>
+                            <a:schemeClr val="dk1"/>
+                          </a:solidFill>
+                          <a:effectLst/>
+                          <a:latin typeface="Arial Nova Cond Light" panose="020B0306020202020204" pitchFamily="34" charset="0"/>
+                        </a:rPr>
+                        <a:t>SATISFACTORIO</a:t>
+                      </a:r>
+                      <a:endParaRPr lang="es-419" sz="1000" b="0" kern="1200" dirty="0">
+                        <a:solidFill>
+                          <a:schemeClr val="dk1"/>
+                        </a:solidFill>
+                        <a:effectLst/>
+                        <a:latin typeface="Arial Nova Cond Light" panose="020B0306020202020204" pitchFamily="34" charset="0"/>
+                        <a:ea typeface="+mn-ea"/>
+                        <a:cs typeface="+mn-cs"/>
+                      </a:endParaRPr>
+                    </a:p>
+                  </a:txBody>
+                  <a:tcPr/>
+                </a:tc>
+                <a:extLst>
+                  <a:ext uri="{0D108BD9-81ED-4DB2-BD59-A6C34878D82A}">
+                    <a16:rowId xmlns:a16="http://schemas.microsoft.com/office/drawing/2014/main" val="713519944"/>
+                  </a:ext>
+                </a:extLst>
+              </a:tr>
+              <a:tr h="219456">
+                <a:tc>
+                  <a:txBody>
+                    <a:bodyPr/>
+                    <a:lstStyle/>
+                    <a:p>
+                      <a:r>
+                        <a:rPr lang="en-US" sz="1000" dirty="0">
+                          <a:latin typeface="Arial Nova Cond Light" panose="020B0306020202020204" pitchFamily="34" charset="0"/>
+                        </a:rPr>
+                        <a:t>3</a:t>
+                      </a:r>
+                      <a:endParaRPr lang="es-419" sz="1000" dirty="0">
+                        <a:latin typeface="Arial Nova Cond Light" panose="020B0306020202020204" pitchFamily="34" charset="0"/>
+                      </a:endParaRPr>
+                    </a:p>
+                  </a:txBody>
+                  <a:tcPr/>
+                </a:tc>
+                <a:tc>
+                  <a:txBody>
+                    <a:bodyPr/>
+                    <a:lstStyle/>
+                    <a:p>
+                      <a:r>
+                        <a:rPr lang="en-US" sz="1000" dirty="0">
+                          <a:latin typeface="Arial Nova Cond Light" panose="020B0306020202020204" pitchFamily="34" charset="0"/>
+                        </a:rPr>
+                        <a:t>Verde</a:t>
+                      </a:r>
+                      <a:endParaRPr lang="es-419" sz="1000" dirty="0">
+                        <a:latin typeface="Arial Nova Cond Light" panose="020B0306020202020204" pitchFamily="34" charset="0"/>
+                      </a:endParaRPr>
+                    </a:p>
+                  </a:txBody>
+                  <a:tcPr/>
+                </a:tc>
+                <a:tc>
+                  <a:txBody>
+                    <a:bodyPr/>
+                    <a:lstStyle/>
+                    <a:p>
+                      <a:pPr marL="0" marR="0" lvl="0" indent="0" algn="l" defTabSz="914400" rtl="0" eaLnBrk="1" fontAlgn="auto" latinLnBrk="0" hangingPunct="1">
+                        <a:lnSpc>
+                          <a:spcPct val="100000"/>
+                        </a:lnSpc>
+                        <a:spcBef>
+                          <a:spcPts val="0"/>
+                        </a:spcBef>
+                        <a:spcAft>
+                          <a:spcPts val="0"/>
+                        </a:spcAft>
+                        <a:buClrTx/>
+                        <a:buSzTx/>
+                        <a:buFontTx/>
+                        <a:buNone/>
+                        <a:tabLst/>
+                        <a:defRPr/>
+                      </a:pPr>
+                      <a:r>
+                        <a:rPr lang="es-419" sz="1000" b="0" kern="1200" dirty="0">
+                          <a:solidFill>
+                            <a:schemeClr val="dk1"/>
+                          </a:solidFill>
+                          <a:effectLst/>
+                          <a:latin typeface="Arial Nova Cond Light" panose="020B0306020202020204" pitchFamily="34" charset="0"/>
+                        </a:rPr>
+                        <a:t>OPTIMO</a:t>
+                      </a:r>
+                      <a:endParaRPr lang="es-419" sz="1000" b="0" kern="1200" dirty="0">
+                        <a:solidFill>
+                          <a:schemeClr val="dk1"/>
+                        </a:solidFill>
+                        <a:effectLst/>
+                        <a:latin typeface="Arial Nova Cond Light" panose="020B0306020202020204" pitchFamily="34" charset="0"/>
+                        <a:ea typeface="+mn-ea"/>
+                        <a:cs typeface="+mn-cs"/>
+                      </a:endParaRPr>
+                    </a:p>
+                  </a:txBody>
+                  <a:tcPr/>
+                </a:tc>
+                <a:extLst>
+                  <a:ext uri="{0D108BD9-81ED-4DB2-BD59-A6C34878D82A}">
+                    <a16:rowId xmlns:a16="http://schemas.microsoft.com/office/drawing/2014/main" val="3622402942"/>
+                  </a:ext>
+                </a:extLst>
+              </a:tr>
+            </a:tbl>
+          </a:graphicData>
+        </a:graphic>
+      </p:graphicFrame>
+      <p:graphicFrame>
+        <p:nvGraphicFramePr>
+          <p:cNvPr id="9" name="Table 8">
+            <a:extLst>
+              <a:ext uri="{FF2B5EF4-FFF2-40B4-BE49-F238E27FC236}">
+                <a16:creationId xmlns:a16="http://schemas.microsoft.com/office/drawing/2014/main" id="{B9F4EE77-1BC4-0455-3BDB-E179ED28B958}"/>
+              </a:ext>
+            </a:extLst>
+          </p:cNvPr>
+          <p:cNvGraphicFramePr>
+            <a:graphicFrameLocks noGrp="1"/>
+          </p:cNvGraphicFramePr>
+          <p:nvPr>
+            <p:extLst>
+              <p:ext uri="{D42A27DB-BD31-4B8C-83A1-F6EECF244321}">
+                <p14:modId xmlns:p14="http://schemas.microsoft.com/office/powerpoint/2010/main" val="2168101057"/>
+              </p:ext>
+            </p:extLst>
+          </p:nvPr>
+        </p:nvGraphicFramePr>
+        <p:xfrm>
+          <a:off x="7795603" y="3927748"/>
+          <a:ext cx="4065905" cy="2346960"/>
+        </p:xfrm>
+        <a:graphic>
+          <a:graphicData uri="http://schemas.openxmlformats.org/drawingml/2006/table">
+            <a:tbl>
+              <a:tblPr>
+                <a:tableStyleId>{5FD0F851-EC5A-4D38-B0AD-8093EC10F338}</a:tableStyleId>
+              </a:tblPr>
+              <a:tblGrid>
+                <a:gridCol w="1036320">
+                  <a:extLst>
+                    <a:ext uri="{9D8B030D-6E8A-4147-A177-3AD203B41FA5}">
+                      <a16:colId xmlns:a16="http://schemas.microsoft.com/office/drawing/2014/main" val="2359269551"/>
+                    </a:ext>
+                  </a:extLst>
+                </a:gridCol>
+                <a:gridCol w="2056130">
+                  <a:extLst>
+                    <a:ext uri="{9D8B030D-6E8A-4147-A177-3AD203B41FA5}">
+                      <a16:colId xmlns:a16="http://schemas.microsoft.com/office/drawing/2014/main" val="3813789963"/>
+                    </a:ext>
+                  </a:extLst>
+                </a:gridCol>
+                <a:gridCol w="973455">
+                  <a:extLst>
+                    <a:ext uri="{9D8B030D-6E8A-4147-A177-3AD203B41FA5}">
+                      <a16:colId xmlns:a16="http://schemas.microsoft.com/office/drawing/2014/main" val="3118765043"/>
+                    </a:ext>
+                  </a:extLst>
+                </a:gridCol>
+              </a:tblGrid>
+              <a:tr h="237506">
+                <a:tc>
+                  <a:txBody>
+                    <a:bodyPr/>
+                    <a:lstStyle/>
+                    <a:p>
+                      <a:pPr algn="ctr"/>
+                      <a:r>
+                        <a:rPr lang="es-419" sz="1000" b="1" dirty="0">
+                          <a:effectLst/>
+                          <a:latin typeface="Arial Nova Cond Light" panose="020B0306020202020204" pitchFamily="34" charset="0"/>
+                        </a:rPr>
+                        <a:t>Código</a:t>
+                      </a:r>
+                      <a:endParaRPr lang="es-419" sz="1000" b="1" dirty="0">
+                        <a:latin typeface="Arial Nova Cond Light" panose="020B0306020202020204" pitchFamily="34" charset="0"/>
+                      </a:endParaRPr>
+                    </a:p>
+                  </a:txBody>
+                  <a:tcPr anchor="ctr"/>
+                </a:tc>
+                <a:tc>
+                  <a:txBody>
+                    <a:bodyPr/>
+                    <a:lstStyle/>
+                    <a:p>
+                      <a:pPr algn="ctr"/>
+                      <a:r>
+                        <a:rPr lang="es-419" sz="1000" b="1" dirty="0">
+                          <a:effectLst/>
+                          <a:latin typeface="Arial Nova Cond Light" panose="020B0306020202020204" pitchFamily="34" charset="0"/>
+                        </a:rPr>
+                        <a:t>Componente</a:t>
+                      </a:r>
+                      <a:endParaRPr lang="es-419" sz="1000" b="1" dirty="0">
+                        <a:latin typeface="Arial Nova Cond Light" panose="020B0306020202020204" pitchFamily="34" charset="0"/>
+                      </a:endParaRPr>
+                    </a:p>
+                  </a:txBody>
+                  <a:tcPr anchor="ctr"/>
+                </a:tc>
+                <a:tc>
+                  <a:txBody>
+                    <a:bodyPr/>
+                    <a:lstStyle/>
+                    <a:p>
+                      <a:pPr algn="ctr"/>
+                      <a:r>
+                        <a:rPr lang="es-419" sz="1000" b="1" dirty="0">
+                          <a:effectLst/>
+                          <a:latin typeface="Arial Nova Cond Light" panose="020B0306020202020204" pitchFamily="34" charset="0"/>
+                        </a:rPr>
+                        <a:t># Indicadores</a:t>
+                      </a:r>
+                      <a:endParaRPr lang="es-419" sz="1000" b="1" dirty="0">
+                        <a:latin typeface="Arial Nova Cond Light" panose="020B0306020202020204" pitchFamily="34" charset="0"/>
+                      </a:endParaRPr>
+                    </a:p>
+                  </a:txBody>
+                  <a:tcPr anchor="ctr"/>
+                </a:tc>
+                <a:extLst>
+                  <a:ext uri="{0D108BD9-81ED-4DB2-BD59-A6C34878D82A}">
+                    <a16:rowId xmlns:a16="http://schemas.microsoft.com/office/drawing/2014/main" val="2957057960"/>
+                  </a:ext>
+                </a:extLst>
+              </a:tr>
+              <a:tr h="237506">
+                <a:tc>
+                  <a:txBody>
+                    <a:bodyPr/>
+                    <a:lstStyle/>
+                    <a:p>
+                      <a:pPr algn="r"/>
+                      <a:r>
+                        <a:rPr lang="es-419" sz="1000" dirty="0">
+                          <a:effectLst/>
+                          <a:latin typeface="Arial Nova Cond Light" panose="020B0306020202020204" pitchFamily="34" charset="0"/>
+                        </a:rPr>
+                        <a:t>1</a:t>
+                      </a:r>
+                      <a:endParaRPr lang="es-419" sz="1000" dirty="0">
+                        <a:latin typeface="Arial Nova Cond Light" panose="020B0306020202020204" pitchFamily="34" charset="0"/>
+                      </a:endParaRPr>
+                    </a:p>
+                  </a:txBody>
+                  <a:tcPr/>
+                </a:tc>
+                <a:tc>
+                  <a:txBody>
+                    <a:bodyPr/>
+                    <a:lstStyle/>
+                    <a:p>
+                      <a:r>
+                        <a:rPr lang="es-419" sz="1000" b="0" kern="1200" dirty="0">
+                          <a:solidFill>
+                            <a:schemeClr val="tx1"/>
+                          </a:solidFill>
+                          <a:latin typeface="Arial Nova Cond Light" panose="020B0306020202020204" pitchFamily="34" charset="0"/>
+                          <a:ea typeface="+mn-ea"/>
+                          <a:cs typeface="+mn-cs"/>
+                        </a:rPr>
+                        <a:t>Estar</a:t>
+                      </a:r>
+                      <a:r>
+                        <a:rPr lang="es-419" sz="1000" dirty="0">
+                          <a:effectLst/>
+                          <a:latin typeface="Arial Nova Cond Light" panose="020B0306020202020204" pitchFamily="34" charset="0"/>
+                        </a:rPr>
+                        <a:t> libre de contaminación</a:t>
+                      </a:r>
+                      <a:endParaRPr lang="es-419" sz="1000" dirty="0">
+                        <a:latin typeface="Arial Nova Cond Light" panose="020B0306020202020204" pitchFamily="34" charset="0"/>
+                      </a:endParaRPr>
+                    </a:p>
+                  </a:txBody>
+                  <a:tcPr/>
+                </a:tc>
+                <a:tc>
+                  <a:txBody>
+                    <a:bodyPr/>
+                    <a:lstStyle/>
+                    <a:p>
+                      <a:pPr algn="r"/>
+                      <a:r>
+                        <a:rPr lang="es-419" sz="1000" dirty="0">
+                          <a:effectLst/>
+                          <a:latin typeface="Arial Nova Cond Light" panose="020B0306020202020204" pitchFamily="34" charset="0"/>
+                        </a:rPr>
+                        <a:t>19</a:t>
+                      </a:r>
+                      <a:endParaRPr lang="es-419" sz="1000" dirty="0">
+                        <a:latin typeface="Arial Nova Cond Light" panose="020B0306020202020204" pitchFamily="34" charset="0"/>
+                      </a:endParaRPr>
+                    </a:p>
+                  </a:txBody>
+                  <a:tcPr/>
+                </a:tc>
+                <a:extLst>
+                  <a:ext uri="{0D108BD9-81ED-4DB2-BD59-A6C34878D82A}">
+                    <a16:rowId xmlns:a16="http://schemas.microsoft.com/office/drawing/2014/main" val="2722951863"/>
+                  </a:ext>
+                </a:extLst>
+              </a:tr>
+              <a:tr h="237506">
+                <a:tc>
+                  <a:txBody>
+                    <a:bodyPr/>
+                    <a:lstStyle/>
+                    <a:p>
+                      <a:pPr algn="r"/>
+                      <a:r>
+                        <a:rPr lang="es-419" sz="1000">
+                          <a:effectLst/>
+                          <a:latin typeface="Arial Nova Cond Light" panose="020B0306020202020204" pitchFamily="34" charset="0"/>
+                        </a:rPr>
+                        <a:t>2</a:t>
+                      </a:r>
+                      <a:endParaRPr lang="es-419" sz="1000">
+                        <a:latin typeface="Arial Nova Cond Light" panose="020B0306020202020204" pitchFamily="34" charset="0"/>
+                      </a:endParaRPr>
+                    </a:p>
+                  </a:txBody>
+                  <a:tcPr/>
+                </a:tc>
+                <a:tc>
+                  <a:txBody>
+                    <a:bodyPr/>
+                    <a:lstStyle/>
+                    <a:p>
+                      <a:r>
+                        <a:rPr lang="es-419" sz="1000">
+                          <a:effectLst/>
+                          <a:latin typeface="Arial Nova Cond Light" panose="020B0306020202020204" pitchFamily="34" charset="0"/>
+                        </a:rPr>
+                        <a:t>Generar espacios saludables</a:t>
+                      </a:r>
+                      <a:endParaRPr lang="es-419" sz="1000">
+                        <a:latin typeface="Arial Nova Cond Light" panose="020B0306020202020204" pitchFamily="34" charset="0"/>
+                      </a:endParaRPr>
+                    </a:p>
+                  </a:txBody>
+                  <a:tcPr/>
+                </a:tc>
+                <a:tc>
+                  <a:txBody>
+                    <a:bodyPr/>
+                    <a:lstStyle/>
+                    <a:p>
+                      <a:pPr algn="r"/>
+                      <a:r>
+                        <a:rPr lang="es-419" sz="1000" dirty="0">
+                          <a:effectLst/>
+                          <a:latin typeface="Arial Nova Cond Light" panose="020B0306020202020204" pitchFamily="34" charset="0"/>
+                        </a:rPr>
+                        <a:t>17</a:t>
+                      </a:r>
+                      <a:endParaRPr lang="es-419" sz="1000" dirty="0">
+                        <a:latin typeface="Arial Nova Cond Light" panose="020B0306020202020204" pitchFamily="34" charset="0"/>
+                      </a:endParaRPr>
+                    </a:p>
+                  </a:txBody>
+                  <a:tcPr/>
+                </a:tc>
+                <a:extLst>
+                  <a:ext uri="{0D108BD9-81ED-4DB2-BD59-A6C34878D82A}">
+                    <a16:rowId xmlns:a16="http://schemas.microsoft.com/office/drawing/2014/main" val="2933384294"/>
+                  </a:ext>
+                </a:extLst>
+              </a:tr>
+              <a:tr h="237506">
+                <a:tc>
+                  <a:txBody>
+                    <a:bodyPr/>
+                    <a:lstStyle/>
+                    <a:p>
+                      <a:pPr algn="r"/>
+                      <a:r>
+                        <a:rPr lang="es-419" sz="1000" dirty="0">
+                          <a:effectLst/>
+                          <a:latin typeface="Arial Nova Cond Light" panose="020B0306020202020204" pitchFamily="34" charset="0"/>
+                        </a:rPr>
+                        <a:t>3</a:t>
+                      </a:r>
+                      <a:endParaRPr lang="es-419" sz="1000" dirty="0">
+                        <a:latin typeface="Arial Nova Cond Light" panose="020B0306020202020204" pitchFamily="34" charset="0"/>
+                      </a:endParaRPr>
+                    </a:p>
+                  </a:txBody>
+                  <a:tcPr/>
+                </a:tc>
+                <a:tc>
+                  <a:txBody>
+                    <a:bodyPr/>
+                    <a:lstStyle/>
+                    <a:p>
+                      <a:r>
+                        <a:rPr lang="es-419" sz="1000">
+                          <a:effectLst/>
+                          <a:latin typeface="Arial Nova Cond Light" panose="020B0306020202020204" pitchFamily="34" charset="0"/>
+                        </a:rPr>
+                        <a:t>Fomentar la movilidad saludable</a:t>
+                      </a:r>
+                      <a:endParaRPr lang="es-419" sz="1000">
+                        <a:latin typeface="Arial Nova Cond Light" panose="020B0306020202020204" pitchFamily="34" charset="0"/>
+                      </a:endParaRPr>
+                    </a:p>
+                  </a:txBody>
+                  <a:tcPr/>
+                </a:tc>
+                <a:tc>
+                  <a:txBody>
+                    <a:bodyPr/>
+                    <a:lstStyle/>
+                    <a:p>
+                      <a:pPr algn="r"/>
+                      <a:r>
+                        <a:rPr lang="es-419" sz="1000" dirty="0">
+                          <a:effectLst/>
+                          <a:latin typeface="Arial Nova Cond Light" panose="020B0306020202020204" pitchFamily="34" charset="0"/>
+                        </a:rPr>
+                        <a:t>9</a:t>
+                      </a:r>
+                      <a:endParaRPr lang="es-419" sz="1000" dirty="0">
+                        <a:latin typeface="Arial Nova Cond Light" panose="020B0306020202020204" pitchFamily="34" charset="0"/>
+                      </a:endParaRPr>
+                    </a:p>
+                  </a:txBody>
+                  <a:tcPr/>
+                </a:tc>
+                <a:extLst>
+                  <a:ext uri="{0D108BD9-81ED-4DB2-BD59-A6C34878D82A}">
+                    <a16:rowId xmlns:a16="http://schemas.microsoft.com/office/drawing/2014/main" val="4001953587"/>
+                  </a:ext>
+                </a:extLst>
+              </a:tr>
+              <a:tr h="237506">
+                <a:tc>
+                  <a:txBody>
+                    <a:bodyPr/>
+                    <a:lstStyle/>
+                    <a:p>
+                      <a:pPr algn="r"/>
+                      <a:r>
+                        <a:rPr lang="es-419" sz="1000">
+                          <a:effectLst/>
+                          <a:latin typeface="Arial Nova Cond Light" panose="020B0306020202020204" pitchFamily="34" charset="0"/>
+                        </a:rPr>
+                        <a:t>4</a:t>
+                      </a:r>
+                      <a:endParaRPr lang="es-419" sz="1000">
+                        <a:latin typeface="Arial Nova Cond Light" panose="020B0306020202020204" pitchFamily="34" charset="0"/>
+                      </a:endParaRPr>
+                    </a:p>
+                  </a:txBody>
+                  <a:tcPr/>
+                </a:tc>
+                <a:tc>
+                  <a:txBody>
+                    <a:bodyPr/>
+                    <a:lstStyle/>
+                    <a:p>
+                      <a:r>
+                        <a:rPr lang="es-419" sz="1000">
+                          <a:effectLst/>
+                          <a:latin typeface="Arial Nova Cond Light" panose="020B0306020202020204" pitchFamily="34" charset="0"/>
+                        </a:rPr>
+                        <a:t>Impulsar la economía solidaria</a:t>
+                      </a:r>
+                      <a:endParaRPr lang="es-419" sz="1000">
+                        <a:latin typeface="Arial Nova Cond Light" panose="020B0306020202020204" pitchFamily="34" charset="0"/>
+                      </a:endParaRPr>
+                    </a:p>
+                  </a:txBody>
+                  <a:tcPr/>
+                </a:tc>
+                <a:tc>
+                  <a:txBody>
+                    <a:bodyPr/>
+                    <a:lstStyle/>
+                    <a:p>
+                      <a:pPr algn="r"/>
+                      <a:r>
+                        <a:rPr lang="es-419" sz="1000" dirty="0">
+                          <a:effectLst/>
+                          <a:latin typeface="Arial Nova Cond Light" panose="020B0306020202020204" pitchFamily="34" charset="0"/>
+                        </a:rPr>
+                        <a:t>3</a:t>
+                      </a:r>
+                      <a:endParaRPr lang="es-419" sz="1000" dirty="0">
+                        <a:latin typeface="Arial Nova Cond Light" panose="020B0306020202020204" pitchFamily="34" charset="0"/>
+                      </a:endParaRPr>
+                    </a:p>
+                  </a:txBody>
+                  <a:tcPr/>
+                </a:tc>
+                <a:extLst>
+                  <a:ext uri="{0D108BD9-81ED-4DB2-BD59-A6C34878D82A}">
+                    <a16:rowId xmlns:a16="http://schemas.microsoft.com/office/drawing/2014/main" val="2101670819"/>
+                  </a:ext>
+                </a:extLst>
+              </a:tr>
+              <a:tr h="237506">
+                <a:tc>
+                  <a:txBody>
+                    <a:bodyPr/>
+                    <a:lstStyle/>
+                    <a:p>
+                      <a:pPr algn="r"/>
+                      <a:r>
+                        <a:rPr lang="es-419" sz="1000">
+                          <a:effectLst/>
+                          <a:latin typeface="Arial Nova Cond Light" panose="020B0306020202020204" pitchFamily="34" charset="0"/>
+                        </a:rPr>
+                        <a:t>5</a:t>
+                      </a:r>
+                      <a:endParaRPr lang="es-419" sz="1000">
+                        <a:latin typeface="Arial Nova Cond Light" panose="020B0306020202020204" pitchFamily="34" charset="0"/>
+                      </a:endParaRPr>
+                    </a:p>
+                  </a:txBody>
+                  <a:tcPr/>
+                </a:tc>
+                <a:tc>
+                  <a:txBody>
+                    <a:bodyPr/>
+                    <a:lstStyle/>
+                    <a:p>
+                      <a:r>
+                        <a:rPr lang="es-419" sz="1000">
+                          <a:effectLst/>
+                          <a:latin typeface="Arial Nova Cond Light" panose="020B0306020202020204" pitchFamily="34" charset="0"/>
+                        </a:rPr>
+                        <a:t>Incentivar prácticas saludables</a:t>
+                      </a:r>
+                      <a:endParaRPr lang="es-419" sz="1000">
+                        <a:latin typeface="Arial Nova Cond Light" panose="020B0306020202020204" pitchFamily="34" charset="0"/>
+                      </a:endParaRPr>
+                    </a:p>
+                  </a:txBody>
+                  <a:tcPr/>
+                </a:tc>
+                <a:tc>
+                  <a:txBody>
+                    <a:bodyPr/>
+                    <a:lstStyle/>
+                    <a:p>
+                      <a:pPr algn="r"/>
+                      <a:r>
+                        <a:rPr lang="es-419" sz="1000" dirty="0">
+                          <a:effectLst/>
+                          <a:latin typeface="Arial Nova Cond Light" panose="020B0306020202020204" pitchFamily="34" charset="0"/>
+                        </a:rPr>
+                        <a:t>9</a:t>
+                      </a:r>
+                      <a:endParaRPr lang="es-419" sz="1000" dirty="0">
+                        <a:latin typeface="Arial Nova Cond Light" panose="020B0306020202020204" pitchFamily="34" charset="0"/>
+                      </a:endParaRPr>
+                    </a:p>
+                  </a:txBody>
+                  <a:tcPr/>
+                </a:tc>
+                <a:extLst>
+                  <a:ext uri="{0D108BD9-81ED-4DB2-BD59-A6C34878D82A}">
+                    <a16:rowId xmlns:a16="http://schemas.microsoft.com/office/drawing/2014/main" val="4262315344"/>
+                  </a:ext>
+                </a:extLst>
+              </a:tr>
+              <a:tr h="237506">
+                <a:tc>
+                  <a:txBody>
+                    <a:bodyPr/>
+                    <a:lstStyle/>
+                    <a:p>
+                      <a:pPr algn="r"/>
+                      <a:r>
+                        <a:rPr lang="es-419" sz="1000">
+                          <a:effectLst/>
+                          <a:latin typeface="Arial Nova Cond Light" panose="020B0306020202020204" pitchFamily="34" charset="0"/>
+                        </a:rPr>
+                        <a:t>6</a:t>
+                      </a:r>
+                      <a:endParaRPr lang="es-419" sz="1000">
+                        <a:latin typeface="Arial Nova Cond Light" panose="020B0306020202020204" pitchFamily="34" charset="0"/>
+                      </a:endParaRPr>
+                    </a:p>
+                  </a:txBody>
+                  <a:tcPr/>
+                </a:tc>
+                <a:tc>
+                  <a:txBody>
+                    <a:bodyPr/>
+                    <a:lstStyle/>
+                    <a:p>
+                      <a:r>
+                        <a:rPr lang="es-419" sz="1000">
+                          <a:effectLst/>
+                          <a:latin typeface="Arial Nova Cond Light" panose="020B0306020202020204" pitchFamily="34" charset="0"/>
+                        </a:rPr>
+                        <a:t>Gestionar riesgos</a:t>
+                      </a:r>
+                      <a:endParaRPr lang="es-419" sz="1000">
+                        <a:latin typeface="Arial Nova Cond Light" panose="020B0306020202020204" pitchFamily="34" charset="0"/>
+                      </a:endParaRPr>
+                    </a:p>
+                  </a:txBody>
+                  <a:tcPr/>
+                </a:tc>
+                <a:tc>
+                  <a:txBody>
+                    <a:bodyPr/>
+                    <a:lstStyle/>
+                    <a:p>
+                      <a:pPr algn="r"/>
+                      <a:r>
+                        <a:rPr lang="es-419" sz="1000" dirty="0">
+                          <a:effectLst/>
+                          <a:latin typeface="Arial Nova Cond Light" panose="020B0306020202020204" pitchFamily="34" charset="0"/>
+                        </a:rPr>
+                        <a:t>5</a:t>
+                      </a:r>
+                      <a:endParaRPr lang="es-419" sz="1000" dirty="0">
+                        <a:latin typeface="Arial Nova Cond Light" panose="020B0306020202020204" pitchFamily="34" charset="0"/>
+                      </a:endParaRPr>
+                    </a:p>
+                  </a:txBody>
+                  <a:tcPr/>
+                </a:tc>
+                <a:extLst>
+                  <a:ext uri="{0D108BD9-81ED-4DB2-BD59-A6C34878D82A}">
+                    <a16:rowId xmlns:a16="http://schemas.microsoft.com/office/drawing/2014/main" val="3508149100"/>
+                  </a:ext>
+                </a:extLst>
+              </a:tr>
+              <a:tr h="237506">
+                <a:tc>
+                  <a:txBody>
+                    <a:bodyPr/>
+                    <a:lstStyle/>
+                    <a:p>
+                      <a:pPr algn="r"/>
+                      <a:r>
+                        <a:rPr lang="es-419" sz="1000">
+                          <a:effectLst/>
+                          <a:latin typeface="Arial Nova Cond Light" panose="020B0306020202020204" pitchFamily="34" charset="0"/>
+                        </a:rPr>
+                        <a:t>7</a:t>
+                      </a:r>
+                      <a:endParaRPr lang="es-419" sz="1000">
+                        <a:latin typeface="Arial Nova Cond Light" panose="020B0306020202020204" pitchFamily="34" charset="0"/>
+                      </a:endParaRPr>
+                    </a:p>
+                  </a:txBody>
+                  <a:tcPr/>
+                </a:tc>
+                <a:tc>
+                  <a:txBody>
+                    <a:bodyPr/>
+                    <a:lstStyle/>
+                    <a:p>
+                      <a:r>
+                        <a:rPr lang="es-419" sz="1000" dirty="0">
+                          <a:effectLst/>
+                          <a:latin typeface="Arial Nova Cond Light" panose="020B0306020202020204" pitchFamily="34" charset="0"/>
+                        </a:rPr>
+                        <a:t>Planificar de forma participativa</a:t>
+                      </a:r>
+                      <a:endParaRPr lang="es-419" sz="1000" dirty="0">
+                        <a:latin typeface="Arial Nova Cond Light" panose="020B0306020202020204" pitchFamily="34" charset="0"/>
+                      </a:endParaRPr>
+                    </a:p>
+                  </a:txBody>
+                  <a:tcPr/>
+                </a:tc>
+                <a:tc>
+                  <a:txBody>
+                    <a:bodyPr/>
+                    <a:lstStyle/>
+                    <a:p>
+                      <a:pPr algn="r"/>
+                      <a:r>
+                        <a:rPr lang="es-419" sz="1000" dirty="0">
+                          <a:effectLst/>
+                          <a:latin typeface="Arial Nova Cond Light" panose="020B0306020202020204" pitchFamily="34" charset="0"/>
+                        </a:rPr>
+                        <a:t>4</a:t>
+                      </a:r>
+                      <a:endParaRPr lang="es-419" sz="1000" dirty="0">
+                        <a:latin typeface="Arial Nova Cond Light" panose="020B0306020202020204" pitchFamily="34" charset="0"/>
+                      </a:endParaRPr>
+                    </a:p>
+                  </a:txBody>
+                  <a:tcPr/>
+                </a:tc>
+                <a:extLst>
+                  <a:ext uri="{0D108BD9-81ED-4DB2-BD59-A6C34878D82A}">
+                    <a16:rowId xmlns:a16="http://schemas.microsoft.com/office/drawing/2014/main" val="3713324559"/>
+                  </a:ext>
+                </a:extLst>
+              </a:tr>
+              <a:tr h="385948">
+                <a:tc>
+                  <a:txBody>
+                    <a:bodyPr/>
+                    <a:lstStyle/>
+                    <a:p>
+                      <a:pPr algn="r"/>
+                      <a:br>
+                        <a:rPr lang="es-419" sz="1000">
+                          <a:effectLst/>
+                          <a:latin typeface="Arial Nova Cond Light" panose="020B0306020202020204" pitchFamily="34" charset="0"/>
+                        </a:rPr>
+                      </a:br>
+                      <a:endParaRPr lang="es-419" sz="1000">
+                        <a:latin typeface="Arial Nova Cond Light" panose="020B0306020202020204" pitchFamily="34" charset="0"/>
+                      </a:endParaRPr>
+                    </a:p>
+                  </a:txBody>
+                  <a:tcPr/>
+                </a:tc>
+                <a:tc>
+                  <a:txBody>
+                    <a:bodyPr/>
+                    <a:lstStyle/>
+                    <a:p>
+                      <a:pPr algn="r"/>
+                      <a:r>
+                        <a:rPr lang="es-419" sz="1000" b="1" dirty="0">
+                          <a:effectLst/>
+                          <a:latin typeface="Arial Nova Cond Light" panose="020B0306020202020204" pitchFamily="34" charset="0"/>
+                        </a:rPr>
+                        <a:t>Total</a:t>
+                      </a:r>
+                      <a:endParaRPr lang="es-419" sz="1000" b="1" dirty="0">
+                        <a:latin typeface="Arial Nova Cond Light" panose="020B0306020202020204" pitchFamily="34" charset="0"/>
+                      </a:endParaRPr>
+                    </a:p>
+                  </a:txBody>
+                  <a:tcPr/>
+                </a:tc>
+                <a:tc>
+                  <a:txBody>
+                    <a:bodyPr/>
+                    <a:lstStyle/>
+                    <a:p>
+                      <a:pPr algn="r"/>
+                      <a:r>
+                        <a:rPr lang="es-419" sz="1000" dirty="0">
+                          <a:effectLst/>
+                          <a:latin typeface="Arial Nova Cond Light" panose="020B0306020202020204" pitchFamily="34" charset="0"/>
+                        </a:rPr>
+                        <a:t>66</a:t>
+                      </a:r>
+                      <a:endParaRPr lang="es-419" sz="1000" dirty="0">
+                        <a:latin typeface="Arial Nova Cond Light" panose="020B0306020202020204" pitchFamily="34" charset="0"/>
+                      </a:endParaRPr>
+                    </a:p>
+                  </a:txBody>
+                  <a:tcPr/>
+                </a:tc>
+                <a:extLst>
+                  <a:ext uri="{0D108BD9-81ED-4DB2-BD59-A6C34878D82A}">
+                    <a16:rowId xmlns:a16="http://schemas.microsoft.com/office/drawing/2014/main" val="4146954247"/>
+                  </a:ext>
+                </a:extLst>
+              </a:tr>
+            </a:tbl>
+          </a:graphicData>
+        </a:graphic>
+      </p:graphicFrame>
+      <p:graphicFrame>
+        <p:nvGraphicFramePr>
+          <p:cNvPr id="10" name="Table 8">
+            <a:extLst>
+              <a:ext uri="{FF2B5EF4-FFF2-40B4-BE49-F238E27FC236}">
+                <a16:creationId xmlns:a16="http://schemas.microsoft.com/office/drawing/2014/main" id="{5F22CC1F-23BC-19C7-C842-2AB379C18FA3}"/>
+              </a:ext>
+            </a:extLst>
+          </p:cNvPr>
+          <p:cNvGraphicFramePr>
+            <a:graphicFrameLocks noGrp="1"/>
+          </p:cNvGraphicFramePr>
+          <p:nvPr>
+            <p:extLst>
+              <p:ext uri="{D42A27DB-BD31-4B8C-83A1-F6EECF244321}">
+                <p14:modId xmlns:p14="http://schemas.microsoft.com/office/powerpoint/2010/main" val="3532220668"/>
+              </p:ext>
+            </p:extLst>
+          </p:nvPr>
+        </p:nvGraphicFramePr>
+        <p:xfrm>
+          <a:off x="2179067" y="4552916"/>
+          <a:ext cx="4240750" cy="1463040"/>
+        </p:xfrm>
+        <a:graphic>
+          <a:graphicData uri="http://schemas.openxmlformats.org/drawingml/2006/table">
+            <a:tbl>
+              <a:tblPr firstRow="1" bandRow="1">
+                <a:tableStyleId>{3B4B98B0-60AC-42C2-AFA5-B58CD77FA1E5}</a:tableStyleId>
+              </a:tblPr>
+              <a:tblGrid>
+                <a:gridCol w="757843">
+                  <a:extLst>
+                    <a:ext uri="{9D8B030D-6E8A-4147-A177-3AD203B41FA5}">
+                      <a16:colId xmlns:a16="http://schemas.microsoft.com/office/drawing/2014/main" val="2663020655"/>
+                    </a:ext>
+                  </a:extLst>
+                </a:gridCol>
+                <a:gridCol w="533717">
+                  <a:extLst>
+                    <a:ext uri="{9D8B030D-6E8A-4147-A177-3AD203B41FA5}">
+                      <a16:colId xmlns:a16="http://schemas.microsoft.com/office/drawing/2014/main" val="1249331176"/>
+                    </a:ext>
+                  </a:extLst>
+                </a:gridCol>
+                <a:gridCol w="1181418">
+                  <a:extLst>
+                    <a:ext uri="{9D8B030D-6E8A-4147-A177-3AD203B41FA5}">
+                      <a16:colId xmlns:a16="http://schemas.microsoft.com/office/drawing/2014/main" val="1051804691"/>
+                    </a:ext>
+                  </a:extLst>
+                </a:gridCol>
+                <a:gridCol w="1767772">
+                  <a:extLst>
+                    <a:ext uri="{9D8B030D-6E8A-4147-A177-3AD203B41FA5}">
+                      <a16:colId xmlns:a16="http://schemas.microsoft.com/office/drawing/2014/main" val="273057811"/>
+                    </a:ext>
+                  </a:extLst>
+                </a:gridCol>
+              </a:tblGrid>
+              <a:tr h="219456">
+                <a:tc>
+                  <a:txBody>
+                    <a:bodyPr/>
+                    <a:lstStyle/>
+                    <a:p>
+                      <a:pPr algn="ctr"/>
+                      <a:r>
+                        <a:rPr lang="en-US" sz="1000" dirty="0">
+                          <a:latin typeface="Arial Nova Cond Light" panose="020B0306020202020204" pitchFamily="34" charset="0"/>
+                        </a:rPr>
+                        <a:t>C</a:t>
+                      </a:r>
+                      <a:r>
+                        <a:rPr lang="es-419" sz="1000" dirty="0" err="1">
+                          <a:latin typeface="Arial Nova Cond Light" panose="020B0306020202020204" pitchFamily="34" charset="0"/>
+                        </a:rPr>
+                        <a:t>ódigo</a:t>
+                      </a:r>
+                      <a:endParaRPr lang="es-419" sz="1000" dirty="0">
+                        <a:latin typeface="Arial Nova Cond Light" panose="020B0306020202020204" pitchFamily="34" charset="0"/>
+                      </a:endParaRPr>
+                    </a:p>
+                  </a:txBody>
+                  <a:tcPr anchor="ctr"/>
+                </a:tc>
+                <a:tc>
+                  <a:txBody>
+                    <a:bodyPr/>
+                    <a:lstStyle/>
+                    <a:p>
+                      <a:pPr algn="ctr"/>
+                      <a:r>
+                        <a:rPr lang="es-419" sz="1000" dirty="0">
+                          <a:latin typeface="Arial Nova Cond Light" panose="020B0306020202020204" pitchFamily="34" charset="0"/>
+                        </a:rPr>
+                        <a:t>Cantón</a:t>
+                      </a:r>
+                    </a:p>
+                  </a:txBody>
+                  <a:tcPr anchor="ctr"/>
+                </a:tc>
+                <a:tc>
+                  <a:txBody>
+                    <a:bodyPr/>
+                    <a:lstStyle/>
+                    <a:p>
+                      <a:pPr algn="ctr"/>
+                      <a:r>
+                        <a:rPr lang="en-US" sz="1000" dirty="0">
+                          <a:latin typeface="Arial Nova Cond Light" panose="020B0306020202020204" pitchFamily="34" charset="0"/>
+                        </a:rPr>
+                        <a:t>Sitio</a:t>
+                      </a:r>
+                      <a:endParaRPr lang="es-419" sz="1000" dirty="0">
+                        <a:latin typeface="Arial Nova Cond Light" panose="020B0306020202020204" pitchFamily="34" charset="0"/>
+                      </a:endParaRPr>
+                    </a:p>
+                  </a:txBody>
+                  <a:tcPr anchor="ctr"/>
+                </a:tc>
+                <a:tc>
+                  <a:txBody>
+                    <a:bodyPr/>
+                    <a:lstStyle/>
+                    <a:p>
+                      <a:pPr algn="ctr"/>
+                      <a:r>
+                        <a:rPr lang="es-419" sz="1000" noProof="0" dirty="0">
+                          <a:latin typeface="Arial Nova Cond Light" panose="020B0306020202020204" pitchFamily="34" charset="0"/>
+                        </a:rPr>
+                        <a:t>Valoración</a:t>
+                      </a:r>
+                    </a:p>
+                  </a:txBody>
+                  <a:tcPr anchor="ctr"/>
+                </a:tc>
+                <a:extLst>
+                  <a:ext uri="{0D108BD9-81ED-4DB2-BD59-A6C34878D82A}">
+                    <a16:rowId xmlns:a16="http://schemas.microsoft.com/office/drawing/2014/main" val="1426178727"/>
+                  </a:ext>
+                </a:extLst>
+              </a:tr>
+              <a:tr h="219456">
+                <a:tc>
+                  <a:txBody>
+                    <a:bodyPr/>
+                    <a:lstStyle/>
+                    <a:p>
+                      <a:r>
+                        <a:rPr lang="es-419" sz="1000" b="0" i="0" kern="1200" dirty="0">
+                          <a:solidFill>
+                            <a:schemeClr val="tx1"/>
+                          </a:solidFill>
+                          <a:effectLst/>
+                          <a:latin typeface="Arial Nova Cond Light" panose="020B0306020202020204" pitchFamily="34" charset="0"/>
+                          <a:ea typeface="+mn-ea"/>
+                          <a:cs typeface="+mn-cs"/>
+                        </a:rPr>
+                        <a:t>1701010001</a:t>
+                      </a:r>
+                      <a:endParaRPr lang="es-419" sz="1000" dirty="0">
+                        <a:latin typeface="Arial Nova Cond Light" panose="020B0306020202020204" pitchFamily="34" charset="0"/>
+                      </a:endParaRPr>
+                    </a:p>
+                  </a:txBody>
+                  <a:tcPr/>
+                </a:tc>
+                <a:tc>
+                  <a:txBody>
+                    <a:bodyPr/>
+                    <a:lstStyle/>
+                    <a:p>
+                      <a:r>
+                        <a:rPr lang="es-419" sz="1000" dirty="0">
+                          <a:latin typeface="Arial Nova Cond Light" panose="020B0306020202020204" pitchFamily="34" charset="0"/>
+                        </a:rPr>
+                        <a:t>Quito</a:t>
+                      </a:r>
+                    </a:p>
+                  </a:txBody>
+                  <a:tcPr/>
+                </a:tc>
+                <a:tc>
+                  <a:txBody>
+                    <a:bodyPr/>
+                    <a:lstStyle/>
+                    <a:p>
+                      <a:r>
+                        <a:rPr lang="es-419" sz="1000" dirty="0">
+                          <a:latin typeface="Arial Nova Cond Light" panose="020B0306020202020204" pitchFamily="34" charset="0"/>
+                        </a:rPr>
+                        <a:t>Parque Bicentenario</a:t>
+                      </a:r>
+                    </a:p>
+                  </a:txBody>
+                  <a:tcPr/>
+                </a:tc>
+                <a:tc>
+                  <a:txBody>
+                    <a:bodyPr/>
+                    <a:lstStyle/>
+                    <a:p>
+                      <a:pPr marL="0" marR="0" lvl="0" indent="0" algn="l" defTabSz="914400" rtl="0" eaLnBrk="1" fontAlgn="auto" latinLnBrk="0" hangingPunct="1">
+                        <a:lnSpc>
+                          <a:spcPct val="100000"/>
+                        </a:lnSpc>
+                        <a:spcBef>
+                          <a:spcPts val="0"/>
+                        </a:spcBef>
+                        <a:spcAft>
+                          <a:spcPts val="0"/>
+                        </a:spcAft>
+                        <a:buClrTx/>
+                        <a:buSzTx/>
+                        <a:buFontTx/>
+                        <a:buNone/>
+                        <a:tabLst/>
+                        <a:defRPr/>
+                      </a:pPr>
+                      <a:endParaRPr lang="es-419" sz="1000" b="0" kern="1200" dirty="0">
+                        <a:solidFill>
+                          <a:schemeClr val="dk1"/>
+                        </a:solidFill>
+                        <a:effectLst/>
+                        <a:latin typeface="Arial Nova Cond Light" panose="020B0306020202020204" pitchFamily="34" charset="0"/>
+                        <a:ea typeface="+mn-ea"/>
+                        <a:cs typeface="+mn-cs"/>
+                      </a:endParaRPr>
+                    </a:p>
+                  </a:txBody>
+                  <a:tcPr/>
+                </a:tc>
+                <a:extLst>
+                  <a:ext uri="{0D108BD9-81ED-4DB2-BD59-A6C34878D82A}">
+                    <a16:rowId xmlns:a16="http://schemas.microsoft.com/office/drawing/2014/main" val="760433361"/>
+                  </a:ext>
+                </a:extLst>
+              </a:tr>
+              <a:tr h="219456">
+                <a:tc>
+                  <a:txBody>
+                    <a:bodyPr/>
+                    <a:lstStyle/>
+                    <a:p>
+                      <a:r>
+                        <a:rPr lang="es-419" sz="1000" b="0" i="0" kern="1200" dirty="0">
+                          <a:solidFill>
+                            <a:schemeClr val="tx1"/>
+                          </a:solidFill>
+                          <a:effectLst/>
+                          <a:latin typeface="Arial Nova Cond Light" panose="020B0306020202020204" pitchFamily="34" charset="0"/>
+                          <a:ea typeface="+mn-ea"/>
+                          <a:cs typeface="+mn-cs"/>
+                        </a:rPr>
+                        <a:t>1701010002</a:t>
+                      </a:r>
+                      <a:endParaRPr lang="es-419" sz="1000" dirty="0">
+                        <a:latin typeface="Arial Nova Cond Light" panose="020B0306020202020204" pitchFamily="34" charset="0"/>
+                      </a:endParaRPr>
+                    </a:p>
+                  </a:txBody>
+                  <a:tcPr/>
+                </a:tc>
+                <a:tc>
+                  <a:txBody>
+                    <a:bodyPr/>
+                    <a:lstStyle/>
+                    <a:p>
+                      <a:pPr marL="0" marR="0" lvl="0" indent="0" algn="l" defTabSz="914400" rtl="0" eaLnBrk="1" fontAlgn="auto" latinLnBrk="0" hangingPunct="1">
+                        <a:lnSpc>
+                          <a:spcPct val="100000"/>
+                        </a:lnSpc>
+                        <a:spcBef>
+                          <a:spcPts val="0"/>
+                        </a:spcBef>
+                        <a:spcAft>
+                          <a:spcPts val="0"/>
+                        </a:spcAft>
+                        <a:buClrTx/>
+                        <a:buSzTx/>
+                        <a:buFontTx/>
+                        <a:buNone/>
+                        <a:tabLst/>
+                        <a:defRPr/>
+                      </a:pPr>
+                      <a:r>
+                        <a:rPr lang="es-419" sz="1000" dirty="0">
+                          <a:latin typeface="Arial Nova Cond Light" panose="020B0306020202020204" pitchFamily="34" charset="0"/>
+                        </a:rPr>
+                        <a:t>Quito</a:t>
+                      </a:r>
+                    </a:p>
+                  </a:txBody>
+                  <a:tcPr/>
+                </a:tc>
+                <a:tc>
+                  <a:txBody>
+                    <a:bodyPr/>
+                    <a:lstStyle/>
+                    <a:p>
+                      <a:r>
+                        <a:rPr lang="es-419" sz="1000" dirty="0">
+                          <a:latin typeface="Arial Nova Cond Light" panose="020B0306020202020204" pitchFamily="34" charset="0"/>
+                        </a:rPr>
+                        <a:t>Parque Ejido</a:t>
+                      </a:r>
+                    </a:p>
+                  </a:txBody>
+                  <a:tcPr/>
+                </a:tc>
+                <a:tc>
+                  <a:txBody>
+                    <a:bodyPr/>
+                    <a:lstStyle/>
+                    <a:p>
+                      <a:pPr marL="0" marR="0" lvl="0" indent="0" algn="l" defTabSz="914400" rtl="0" eaLnBrk="1" fontAlgn="auto" latinLnBrk="0" hangingPunct="1">
+                        <a:lnSpc>
+                          <a:spcPct val="100000"/>
+                        </a:lnSpc>
+                        <a:spcBef>
+                          <a:spcPts val="0"/>
+                        </a:spcBef>
+                        <a:spcAft>
+                          <a:spcPts val="0"/>
+                        </a:spcAft>
+                        <a:buClrTx/>
+                        <a:buSzTx/>
+                        <a:buFontTx/>
+                        <a:buNone/>
+                        <a:tabLst/>
+                        <a:defRPr/>
+                      </a:pPr>
+                      <a:endParaRPr lang="es-419" sz="1000" b="0" kern="1200" dirty="0">
+                        <a:solidFill>
+                          <a:schemeClr val="dk1"/>
+                        </a:solidFill>
+                        <a:effectLst/>
+                        <a:latin typeface="Arial Nova Cond Light" panose="020B0306020202020204" pitchFamily="34" charset="0"/>
+                        <a:ea typeface="+mn-ea"/>
+                        <a:cs typeface="+mn-cs"/>
+                      </a:endParaRPr>
+                    </a:p>
+                  </a:txBody>
+                  <a:tcPr/>
+                </a:tc>
+                <a:extLst>
+                  <a:ext uri="{0D108BD9-81ED-4DB2-BD59-A6C34878D82A}">
+                    <a16:rowId xmlns:a16="http://schemas.microsoft.com/office/drawing/2014/main" val="3368253912"/>
+                  </a:ext>
+                </a:extLst>
+              </a:tr>
+              <a:tr h="219456">
+                <a:tc>
+                  <a:txBody>
+                    <a:bodyPr/>
+                    <a:lstStyle/>
+                    <a:p>
+                      <a:r>
+                        <a:rPr lang="es-419" sz="1000" b="0" i="0" kern="1200" dirty="0">
+                          <a:solidFill>
+                            <a:schemeClr val="tx1"/>
+                          </a:solidFill>
+                          <a:effectLst/>
+                          <a:latin typeface="Arial Nova Cond Light" panose="020B0306020202020204" pitchFamily="34" charset="0"/>
+                          <a:ea typeface="+mn-ea"/>
+                          <a:cs typeface="+mn-cs"/>
+                        </a:rPr>
+                        <a:t>1701010003</a:t>
+                      </a:r>
+                      <a:endParaRPr lang="es-419" sz="1000" dirty="0">
+                        <a:latin typeface="Arial Nova Cond Light" panose="020B0306020202020204" pitchFamily="34" charset="0"/>
+                      </a:endParaRPr>
+                    </a:p>
+                  </a:txBody>
+                  <a:tcPr/>
+                </a:tc>
+                <a:tc>
+                  <a:txBody>
+                    <a:bodyPr/>
+                    <a:lstStyle/>
+                    <a:p>
+                      <a:pPr marL="0" marR="0" lvl="0" indent="0" algn="l" defTabSz="914400" rtl="0" eaLnBrk="1" fontAlgn="auto" latinLnBrk="0" hangingPunct="1">
+                        <a:lnSpc>
+                          <a:spcPct val="100000"/>
+                        </a:lnSpc>
+                        <a:spcBef>
+                          <a:spcPts val="0"/>
+                        </a:spcBef>
+                        <a:spcAft>
+                          <a:spcPts val="0"/>
+                        </a:spcAft>
+                        <a:buClrTx/>
+                        <a:buSzTx/>
+                        <a:buFontTx/>
+                        <a:buNone/>
+                        <a:tabLst/>
+                        <a:defRPr/>
+                      </a:pPr>
+                      <a:r>
+                        <a:rPr lang="es-419" sz="1000" dirty="0">
+                          <a:latin typeface="Arial Nova Cond Light" panose="020B0306020202020204" pitchFamily="34" charset="0"/>
+                        </a:rPr>
+                        <a:t>Quito</a:t>
+                      </a:r>
+                    </a:p>
+                  </a:txBody>
+                  <a:tcPr/>
+                </a:tc>
+                <a:tc>
+                  <a:txBody>
+                    <a:bodyPr/>
+                    <a:lstStyle/>
+                    <a:p>
+                      <a:r>
+                        <a:rPr lang="es-419" sz="1000" dirty="0">
+                          <a:latin typeface="Arial Nova Cond Light" panose="020B0306020202020204" pitchFamily="34" charset="0"/>
+                        </a:rPr>
+                        <a:t>Parque Itchimbia</a:t>
+                      </a:r>
+                    </a:p>
+                  </a:txBody>
+                  <a:tcPr/>
+                </a:tc>
+                <a:tc>
+                  <a:txBody>
+                    <a:bodyPr/>
+                    <a:lstStyle/>
+                    <a:p>
+                      <a:pPr marL="0" marR="0" lvl="0" indent="0" algn="l" defTabSz="914400" rtl="0" eaLnBrk="1" fontAlgn="auto" latinLnBrk="0" hangingPunct="1">
+                        <a:lnSpc>
+                          <a:spcPct val="100000"/>
+                        </a:lnSpc>
+                        <a:spcBef>
+                          <a:spcPts val="0"/>
+                        </a:spcBef>
+                        <a:spcAft>
+                          <a:spcPts val="0"/>
+                        </a:spcAft>
+                        <a:buClrTx/>
+                        <a:buSzTx/>
+                        <a:buFontTx/>
+                        <a:buNone/>
+                        <a:tabLst/>
+                        <a:defRPr/>
+                      </a:pPr>
+                      <a:endParaRPr lang="es-419" sz="1000" b="0" kern="1200" dirty="0">
+                        <a:solidFill>
+                          <a:schemeClr val="dk1"/>
+                        </a:solidFill>
+                        <a:effectLst/>
+                        <a:latin typeface="Arial Nova Cond Light" panose="020B0306020202020204" pitchFamily="34" charset="0"/>
+                        <a:ea typeface="+mn-ea"/>
+                        <a:cs typeface="+mn-cs"/>
+                      </a:endParaRPr>
+                    </a:p>
+                  </a:txBody>
+                  <a:tcPr/>
+                </a:tc>
+                <a:extLst>
+                  <a:ext uri="{0D108BD9-81ED-4DB2-BD59-A6C34878D82A}">
+                    <a16:rowId xmlns:a16="http://schemas.microsoft.com/office/drawing/2014/main" val="713519944"/>
+                  </a:ext>
+                </a:extLst>
+              </a:tr>
+              <a:tr h="219456">
+                <a:tc>
+                  <a:txBody>
+                    <a:bodyPr/>
+                    <a:lstStyle/>
+                    <a:p>
+                      <a:r>
+                        <a:rPr lang="es-419" sz="1000" b="0" i="0" kern="1200" dirty="0">
+                          <a:solidFill>
+                            <a:schemeClr val="tx1"/>
+                          </a:solidFill>
+                          <a:effectLst/>
+                          <a:latin typeface="Arial Nova Cond Light" panose="020B0306020202020204" pitchFamily="34" charset="0"/>
+                          <a:ea typeface="+mn-ea"/>
+                          <a:cs typeface="+mn-cs"/>
+                        </a:rPr>
+                        <a:t>1701010004</a:t>
+                      </a:r>
+                      <a:endParaRPr lang="es-419" sz="1000" dirty="0">
+                        <a:latin typeface="Arial Nova Cond Light" panose="020B0306020202020204" pitchFamily="34" charset="0"/>
+                      </a:endParaRPr>
+                    </a:p>
+                  </a:txBody>
+                  <a:tcPr/>
+                </a:tc>
+                <a:tc>
+                  <a:txBody>
+                    <a:bodyPr/>
+                    <a:lstStyle/>
+                    <a:p>
+                      <a:pPr marL="0" marR="0" lvl="0" indent="0" algn="l" defTabSz="914400" rtl="0" eaLnBrk="1" fontAlgn="auto" latinLnBrk="0" hangingPunct="1">
+                        <a:lnSpc>
+                          <a:spcPct val="100000"/>
+                        </a:lnSpc>
+                        <a:spcBef>
+                          <a:spcPts val="0"/>
+                        </a:spcBef>
+                        <a:spcAft>
+                          <a:spcPts val="0"/>
+                        </a:spcAft>
+                        <a:buClrTx/>
+                        <a:buSzTx/>
+                        <a:buFontTx/>
+                        <a:buNone/>
+                        <a:tabLst/>
+                        <a:defRPr/>
+                      </a:pPr>
+                      <a:r>
+                        <a:rPr lang="es-419" sz="1000" dirty="0">
+                          <a:latin typeface="Arial Nova Cond Light" panose="020B0306020202020204" pitchFamily="34" charset="0"/>
+                        </a:rPr>
+                        <a:t>Quito</a:t>
+                      </a:r>
+                    </a:p>
+                  </a:txBody>
+                  <a:tcPr/>
+                </a:tc>
+                <a:tc>
+                  <a:txBody>
+                    <a:bodyPr/>
+                    <a:lstStyle/>
+                    <a:p>
+                      <a:r>
+                        <a:rPr lang="es-419" sz="1000" dirty="0">
+                          <a:latin typeface="Arial Nova Cond Light" panose="020B0306020202020204" pitchFamily="34" charset="0"/>
+                        </a:rPr>
+                        <a:t>Parque Metropolitano</a:t>
+                      </a:r>
+                    </a:p>
+                  </a:txBody>
+                  <a:tcPr/>
+                </a:tc>
+                <a:tc>
+                  <a:txBody>
+                    <a:bodyPr/>
+                    <a:lstStyle/>
+                    <a:p>
+                      <a:pPr marL="0" marR="0" lvl="0" indent="0" algn="l" defTabSz="914400" rtl="0" eaLnBrk="1" fontAlgn="auto" latinLnBrk="0" hangingPunct="1">
+                        <a:lnSpc>
+                          <a:spcPct val="100000"/>
+                        </a:lnSpc>
+                        <a:spcBef>
+                          <a:spcPts val="0"/>
+                        </a:spcBef>
+                        <a:spcAft>
+                          <a:spcPts val="0"/>
+                        </a:spcAft>
+                        <a:buClrTx/>
+                        <a:buSzTx/>
+                        <a:buFontTx/>
+                        <a:buNone/>
+                        <a:tabLst/>
+                        <a:defRPr/>
+                      </a:pPr>
+                      <a:endParaRPr lang="es-419" sz="1000" b="0" kern="1200" dirty="0">
+                        <a:solidFill>
+                          <a:schemeClr val="dk1"/>
+                        </a:solidFill>
+                        <a:effectLst/>
+                        <a:latin typeface="Arial Nova Cond Light" panose="020B0306020202020204" pitchFamily="34" charset="0"/>
+                        <a:ea typeface="+mn-ea"/>
+                        <a:cs typeface="+mn-cs"/>
+                      </a:endParaRPr>
+                    </a:p>
+                  </a:txBody>
+                  <a:tcPr/>
+                </a:tc>
+                <a:extLst>
+                  <a:ext uri="{0D108BD9-81ED-4DB2-BD59-A6C34878D82A}">
+                    <a16:rowId xmlns:a16="http://schemas.microsoft.com/office/drawing/2014/main" val="3622402942"/>
+                  </a:ext>
+                </a:extLst>
+              </a:tr>
+              <a:tr h="219456">
+                <a:tc>
+                  <a:txBody>
+                    <a:bodyPr/>
+                    <a:lstStyle/>
+                    <a:p>
+                      <a:r>
+                        <a:rPr lang="es-419" sz="1000" b="0" i="0" kern="1200" dirty="0">
+                          <a:solidFill>
+                            <a:schemeClr val="tx1"/>
+                          </a:solidFill>
+                          <a:effectLst/>
+                          <a:latin typeface="Arial Nova Cond Light" panose="020B0306020202020204" pitchFamily="34" charset="0"/>
+                          <a:ea typeface="+mn-ea"/>
+                          <a:cs typeface="+mn-cs"/>
+                        </a:rPr>
+                        <a:t>1701010005</a:t>
+                      </a:r>
+                      <a:endParaRPr lang="es-419" sz="1000" dirty="0">
+                        <a:latin typeface="Arial Nova Cond Light" panose="020B0306020202020204" pitchFamily="34" charset="0"/>
+                      </a:endParaRPr>
+                    </a:p>
+                  </a:txBody>
+                  <a:tcPr/>
+                </a:tc>
+                <a:tc>
+                  <a:txBody>
+                    <a:bodyPr/>
+                    <a:lstStyle/>
+                    <a:p>
+                      <a:pPr marL="0" marR="0" lvl="0" indent="0" algn="l" defTabSz="914400" rtl="0" eaLnBrk="1" fontAlgn="auto" latinLnBrk="0" hangingPunct="1">
+                        <a:lnSpc>
+                          <a:spcPct val="100000"/>
+                        </a:lnSpc>
+                        <a:spcBef>
+                          <a:spcPts val="0"/>
+                        </a:spcBef>
+                        <a:spcAft>
+                          <a:spcPts val="0"/>
+                        </a:spcAft>
+                        <a:buClrTx/>
+                        <a:buSzTx/>
+                        <a:buFontTx/>
+                        <a:buNone/>
+                        <a:tabLst/>
+                        <a:defRPr/>
+                      </a:pPr>
+                      <a:r>
+                        <a:rPr lang="es-419" sz="1000" dirty="0">
+                          <a:latin typeface="Arial Nova Cond Light" panose="020B0306020202020204" pitchFamily="34" charset="0"/>
+                        </a:rPr>
+                        <a:t>Quito</a:t>
+                      </a:r>
+                    </a:p>
+                  </a:txBody>
+                  <a:tcPr/>
+                </a:tc>
+                <a:tc>
+                  <a:txBody>
+                    <a:bodyPr/>
+                    <a:lstStyle/>
+                    <a:p>
+                      <a:r>
+                        <a:rPr lang="es-419" sz="1000" dirty="0">
+                          <a:latin typeface="Arial Nova Cond Light" panose="020B0306020202020204" pitchFamily="34" charset="0"/>
+                        </a:rPr>
+                        <a:t>Parque La Carolina</a:t>
+                      </a:r>
+                    </a:p>
+                  </a:txBody>
+                  <a:tcPr/>
+                </a:tc>
+                <a:tc>
+                  <a:txBody>
+                    <a:bodyPr/>
+                    <a:lstStyle/>
+                    <a:p>
+                      <a:pPr marL="0" marR="0" lvl="0" indent="0" algn="l" defTabSz="914400" rtl="0" eaLnBrk="1" fontAlgn="auto" latinLnBrk="0" hangingPunct="1">
+                        <a:lnSpc>
+                          <a:spcPct val="100000"/>
+                        </a:lnSpc>
+                        <a:spcBef>
+                          <a:spcPts val="0"/>
+                        </a:spcBef>
+                        <a:spcAft>
+                          <a:spcPts val="0"/>
+                        </a:spcAft>
+                        <a:buClrTx/>
+                        <a:buSzTx/>
+                        <a:buFontTx/>
+                        <a:buNone/>
+                        <a:tabLst/>
+                        <a:defRPr/>
+                      </a:pPr>
+                      <a:endParaRPr lang="es-419" sz="1000" b="0" kern="1200" dirty="0">
+                        <a:solidFill>
+                          <a:schemeClr val="dk1"/>
+                        </a:solidFill>
+                        <a:effectLst/>
+                        <a:latin typeface="Arial Nova Cond Light" panose="020B0306020202020204" pitchFamily="34" charset="0"/>
+                        <a:ea typeface="+mn-ea"/>
+                        <a:cs typeface="+mn-cs"/>
+                      </a:endParaRPr>
+                    </a:p>
+                  </a:txBody>
+                  <a:tcPr/>
+                </a:tc>
+                <a:extLst>
+                  <a:ext uri="{0D108BD9-81ED-4DB2-BD59-A6C34878D82A}">
+                    <a16:rowId xmlns:a16="http://schemas.microsoft.com/office/drawing/2014/main" val="1664705613"/>
+                  </a:ext>
+                </a:extLst>
+              </a:tr>
+            </a:tbl>
+          </a:graphicData>
+        </a:graphic>
+      </p:graphicFrame>
+      <p:pic>
+        <p:nvPicPr>
+          <p:cNvPr id="12" name="Picture 11">
+            <a:extLst>
+              <a:ext uri="{FF2B5EF4-FFF2-40B4-BE49-F238E27FC236}">
+                <a16:creationId xmlns:a16="http://schemas.microsoft.com/office/drawing/2014/main" id="{5035B959-CF15-556E-AC01-0B9521DB41CD}"/>
+              </a:ext>
+            </a:extLst>
+          </p:cNvPr>
+          <p:cNvPicPr>
+            <a:picLocks noChangeAspect="1"/>
+          </p:cNvPicPr>
+          <p:nvPr/>
+        </p:nvPicPr>
+        <p:blipFill>
+          <a:blip r:embed="rId5"/>
+          <a:stretch>
+            <a:fillRect/>
+          </a:stretch>
+        </p:blipFill>
+        <p:spPr>
+          <a:xfrm>
+            <a:off x="5139638" y="117177"/>
+            <a:ext cx="1984620" cy="4264624"/>
+          </a:xfrm>
+          <a:prstGeom prst="rect">
+            <a:avLst/>
+          </a:prstGeom>
+        </p:spPr>
+      </p:pic>
+      <p:sp>
+        <p:nvSpPr>
+          <p:cNvPr id="13" name="Rectangle: Rounded Corners 12">
+            <a:extLst>
+              <a:ext uri="{FF2B5EF4-FFF2-40B4-BE49-F238E27FC236}">
+                <a16:creationId xmlns:a16="http://schemas.microsoft.com/office/drawing/2014/main" id="{34BBD538-1E68-B06A-2202-79D973A28DDA}"/>
+              </a:ext>
+            </a:extLst>
+          </p:cNvPr>
+          <p:cNvSpPr/>
+          <p:nvPr/>
+        </p:nvSpPr>
+        <p:spPr>
+          <a:xfrm>
+            <a:off x="5882640" y="1436741"/>
+            <a:ext cx="647700" cy="299668"/>
+          </a:xfrm>
+          <a:prstGeom prst="roundRect">
+            <a:avLst/>
+          </a:prstGeom>
+          <a:noFill/>
+          <a:ln w="28575" cap="flat" cmpd="sng" algn="ctr">
+            <a:solidFill>
+              <a:srgbClr val="00FF00"/>
+            </a:solidFill>
+            <a:prstDash val="solid"/>
+            <a:round/>
+            <a:headEnd type="none" w="med" len="med"/>
+            <a:tailEnd type="none" w="med" len="med"/>
+          </a:ln>
+        </p:spPr>
+        <p:style>
+          <a:lnRef idx="0">
+            <a:scrgbClr r="0" g="0" b="0"/>
+          </a:lnRef>
+          <a:fillRef idx="0">
+            <a:scrgbClr r="0" g="0" b="0"/>
+          </a:fillRef>
+          <a:effectRef idx="0">
+            <a:scrgbClr r="0" g="0" b="0"/>
+          </a:effectRef>
+          <a:fontRef idx="minor">
+            <a:schemeClr val="dk1"/>
+          </a:fontRef>
+        </p:style>
+        <p:txBody>
+          <a:bodyPr rtlCol="0" anchor="ctr"/>
+          <a:lstStyle/>
+          <a:p>
+            <a:pPr algn="ctr"/>
+            <a:endParaRPr lang="es-419"/>
           </a:p>
         </p:txBody>
       </p:sp>
@@ -12995,7 +14912,7 @@
               <a:rPr lang="es-ES" sz="1400" dirty="0">
                 <a:latin typeface="Arial Nova Cond Light" panose="020B0306020202020204" pitchFamily="34" charset="0"/>
               </a:rPr>
-              <a:t>Indicadores (77)</a:t>
+              <a:t>Indicadores (66)</a:t>
             </a:r>
           </a:p>
         </p:txBody>

</xml_diff>